<commit_message>
Mise à jour du portfolio
</commit_message>
<xml_diff>
--- a/docs/Veille_Technologique_Domotique_Couleurs.pptx
+++ b/docs/Veille_Technologique_Domotique_Couleurs.pptx
@@ -126,6 +126,43 @@
 </p:presentation>
 </file>
 
+<file path=ppt/revisionInfo.xml><?xml version="1.0" encoding="utf-8"?>
+<p1510:revInfo xmlns:a="http://schemas.openxmlformats.org/drawingml/2006/main" xmlns:r="http://schemas.openxmlformats.org/officeDocument/2006/relationships" xmlns:p1510="http://schemas.microsoft.com/office/powerpoint/2015/10/main">
+  <p1510:revLst>
+    <p1510:client id="{CFD61D3F-51BC-01B6-FB91-2A383D70C29C}" v="56" dt="2025-04-11T09:46:11.725"/>
+  </p1510:revLst>
+</p1510:revInfo>
+</file>
+
+<file path=ppt/changesInfos/changesInfo1.xml><?xml version="1.0" encoding="utf-8"?>
+<pc:chgInfo xmlns:a="http://schemas.openxmlformats.org/drawingml/2006/main" xmlns:r="http://schemas.openxmlformats.org/officeDocument/2006/relationships" xmlns:ac="http://schemas.microsoft.com/office/drawing/2013/main/command" xmlns:pc="http://schemas.microsoft.com/office/powerpoint/2013/main/command">
+  <pc:docChgLst>
+    <pc:chgData name="Yasser FEKHAR" userId="S::y.fekhar@insta.fr::5332b0ee-0f55-4992-b204-aa6f8ebf61bf" providerId="AD" clId="Web-{CFD61D3F-51BC-01B6-FB91-2A383D70C29C}"/>
+    <pc:docChg chg="modSld">
+      <pc:chgData name="Yasser FEKHAR" userId="S::y.fekhar@insta.fr::5332b0ee-0f55-4992-b204-aa6f8ebf61bf" providerId="AD" clId="Web-{CFD61D3F-51BC-01B6-FB91-2A383D70C29C}" dt="2025-04-11T09:46:11.709" v="32" actId="20577"/>
+      <pc:docMkLst>
+        <pc:docMk/>
+      </pc:docMkLst>
+      <pc:sldChg chg="addSp modSp">
+        <pc:chgData name="Yasser FEKHAR" userId="S::y.fekhar@insta.fr::5332b0ee-0f55-4992-b204-aa6f8ebf61bf" providerId="AD" clId="Web-{CFD61D3F-51BC-01B6-FB91-2A383D70C29C}" dt="2025-04-11T09:46:11.709" v="32" actId="20577"/>
+        <pc:sldMkLst>
+          <pc:docMk/>
+          <pc:sldMk cId="0" sldId="259"/>
+        </pc:sldMkLst>
+        <pc:spChg chg="add mod">
+          <ac:chgData name="Yasser FEKHAR" userId="S::y.fekhar@insta.fr::5332b0ee-0f55-4992-b204-aa6f8ebf61bf" providerId="AD" clId="Web-{CFD61D3F-51BC-01B6-FB91-2A383D70C29C}" dt="2025-04-11T09:46:11.709" v="32" actId="20577"/>
+          <ac:spMkLst>
+            <pc:docMk/>
+            <pc:sldMk cId="0" sldId="259"/>
+            <ac:spMk id="4" creationId="{AC2136DA-0259-022B-DB28-0E1164B0FB03}"/>
+          </ac:spMkLst>
+        </pc:spChg>
+      </pc:sldChg>
+    </pc:docChg>
+  </pc:docChgLst>
+</pc:chgInfo>
+</file>
+
 <file path=ppt/slideLayouts/slideLayout1.xml><?xml version="1.0" encoding="utf-8"?>
 <p:sldLayout xmlns:a="http://schemas.openxmlformats.org/drawingml/2006/main" xmlns:r="http://schemas.openxmlformats.org/officeDocument/2006/relationships" xmlns:p="http://schemas.openxmlformats.org/presentationml/2006/main" showMasterSp="0" type="title" preserve="1">
   <p:cSld name="Diapositive de titre">
@@ -302,7 +339,7 @@
           <a:p>
             <a:fld id="{5BCAD085-E8A6-8845-BD4E-CB4CCA059FC4}" type="datetimeFigureOut">
               <a:rPr lang="en-US" smtClean="0"/>
-              <a:t>4/10/2025</a:t>
+              <a:t>4/11/2025</a:t>
             </a:fld>
             <a:endParaRPr lang="en-US"/>
           </a:p>
@@ -344,7 +381,7 @@
           <a:p>
             <a:fld id="{C1FF6DA9-008F-8B48-92A6-B652298478BF}" type="slidenum">
               <a:rPr lang="en-US" smtClean="0"/>
-              <a:t>‹N°›</a:t>
+              <a:t>‹#›</a:t>
             </a:fld>
             <a:endParaRPr lang="en-US"/>
           </a:p>
@@ -472,7 +509,7 @@
           <a:p>
             <a:fld id="{5BCAD085-E8A6-8845-BD4E-CB4CCA059FC4}" type="datetimeFigureOut">
               <a:rPr lang="en-US" smtClean="0"/>
-              <a:t>4/10/2025</a:t>
+              <a:t>4/11/2025</a:t>
             </a:fld>
             <a:endParaRPr lang="en-US"/>
           </a:p>
@@ -514,7 +551,7 @@
           <a:p>
             <a:fld id="{C1FF6DA9-008F-8B48-92A6-B652298478BF}" type="slidenum">
               <a:rPr lang="en-US" smtClean="0"/>
-              <a:t>‹N°›</a:t>
+              <a:t>‹#›</a:t>
             </a:fld>
             <a:endParaRPr lang="en-US"/>
           </a:p>
@@ -695,7 +732,7 @@
           <a:p>
             <a:fld id="{5BCAD085-E8A6-8845-BD4E-CB4CCA059FC4}" type="datetimeFigureOut">
               <a:rPr lang="en-US" smtClean="0"/>
-              <a:t>4/10/2025</a:t>
+              <a:t>4/11/2025</a:t>
             </a:fld>
             <a:endParaRPr lang="en-US"/>
           </a:p>
@@ -747,7 +784,7 @@
           <a:p>
             <a:fld id="{C1FF6DA9-008F-8B48-92A6-B652298478BF}" type="slidenum">
               <a:rPr lang="en-US" smtClean="0"/>
-              <a:t>‹N°›</a:t>
+              <a:t>‹#›</a:t>
             </a:fld>
             <a:endParaRPr lang="en-US"/>
           </a:p>
@@ -875,7 +912,7 @@
           <a:p>
             <a:fld id="{5BCAD085-E8A6-8845-BD4E-CB4CCA059FC4}" type="datetimeFigureOut">
               <a:rPr lang="en-US" smtClean="0"/>
-              <a:t>4/10/2025</a:t>
+              <a:t>4/11/2025</a:t>
             </a:fld>
             <a:endParaRPr lang="en-US"/>
           </a:p>
@@ -917,7 +954,7 @@
           <a:p>
             <a:fld id="{C1FF6DA9-008F-8B48-92A6-B652298478BF}" type="slidenum">
               <a:rPr lang="en-US" smtClean="0"/>
-              <a:t>‹N°›</a:t>
+              <a:t>‹#›</a:t>
             </a:fld>
             <a:endParaRPr lang="en-US"/>
           </a:p>
@@ -1181,7 +1218,7 @@
           <a:p>
             <a:fld id="{5BCAD085-E8A6-8845-BD4E-CB4CCA059FC4}" type="datetimeFigureOut">
               <a:rPr lang="en-US" smtClean="0"/>
-              <a:t>4/10/2025</a:t>
+              <a:t>4/11/2025</a:t>
             </a:fld>
             <a:endParaRPr lang="en-US"/>
           </a:p>
@@ -1239,7 +1276,7 @@
           <a:p>
             <a:fld id="{C1FF6DA9-008F-8B48-92A6-B652298478BF}" type="slidenum">
               <a:rPr lang="en-US" smtClean="0"/>
-              <a:t>‹N°›</a:t>
+              <a:t>‹#›</a:t>
             </a:fld>
             <a:endParaRPr lang="en-US"/>
           </a:p>
@@ -1485,7 +1522,7 @@
           <a:p>
             <a:fld id="{5BCAD085-E8A6-8845-BD4E-CB4CCA059FC4}" type="datetimeFigureOut">
               <a:rPr lang="en-US" smtClean="0"/>
-              <a:t>4/10/2025</a:t>
+              <a:t>4/11/2025</a:t>
             </a:fld>
             <a:endParaRPr lang="en-US"/>
           </a:p>
@@ -1527,7 +1564,7 @@
           <a:p>
             <a:fld id="{C1FF6DA9-008F-8B48-92A6-B652298478BF}" type="slidenum">
               <a:rPr lang="en-US" smtClean="0"/>
-              <a:t>‹N°›</a:t>
+              <a:t>‹#›</a:t>
             </a:fld>
             <a:endParaRPr lang="en-US"/>
           </a:p>
@@ -1907,7 +1944,7 @@
           <a:p>
             <a:fld id="{5BCAD085-E8A6-8845-BD4E-CB4CCA059FC4}" type="datetimeFigureOut">
               <a:rPr lang="en-US" smtClean="0"/>
-              <a:t>4/10/2025</a:t>
+              <a:t>4/11/2025</a:t>
             </a:fld>
             <a:endParaRPr lang="en-US"/>
           </a:p>
@@ -1949,7 +1986,7 @@
           <a:p>
             <a:fld id="{C1FF6DA9-008F-8B48-92A6-B652298478BF}" type="slidenum">
               <a:rPr lang="en-US" smtClean="0"/>
-              <a:t>‹N°›</a:t>
+              <a:t>‹#›</a:t>
             </a:fld>
             <a:endParaRPr lang="en-US"/>
           </a:p>
@@ -2025,7 +2062,7 @@
           <a:p>
             <a:fld id="{5BCAD085-E8A6-8845-BD4E-CB4CCA059FC4}" type="datetimeFigureOut">
               <a:rPr lang="en-US" smtClean="0"/>
-              <a:t>4/10/2025</a:t>
+              <a:t>4/11/2025</a:t>
             </a:fld>
             <a:endParaRPr lang="en-US"/>
           </a:p>
@@ -2067,7 +2104,7 @@
           <a:p>
             <a:fld id="{C1FF6DA9-008F-8B48-92A6-B652298478BF}" type="slidenum">
               <a:rPr lang="en-US" smtClean="0"/>
-              <a:t>‹N°›</a:t>
+              <a:t>‹#›</a:t>
             </a:fld>
             <a:endParaRPr lang="en-US"/>
           </a:p>
@@ -2120,7 +2157,7 @@
           <a:p>
             <a:fld id="{5BCAD085-E8A6-8845-BD4E-CB4CCA059FC4}" type="datetimeFigureOut">
               <a:rPr lang="en-US" smtClean="0"/>
-              <a:t>4/10/2025</a:t>
+              <a:t>4/11/2025</a:t>
             </a:fld>
             <a:endParaRPr lang="en-US"/>
           </a:p>
@@ -2162,7 +2199,7 @@
           <a:p>
             <a:fld id="{C1FF6DA9-008F-8B48-92A6-B652298478BF}" type="slidenum">
               <a:rPr lang="en-US" smtClean="0"/>
-              <a:t>‹N°›</a:t>
+              <a:t>‹#›</a:t>
             </a:fld>
             <a:endParaRPr lang="en-US"/>
           </a:p>
@@ -2393,7 +2430,7 @@
           <a:p>
             <a:fld id="{5BCAD085-E8A6-8845-BD4E-CB4CCA059FC4}" type="datetimeFigureOut">
               <a:rPr lang="en-US" smtClean="0"/>
-              <a:t>4/10/2025</a:t>
+              <a:t>4/11/2025</a:t>
             </a:fld>
             <a:endParaRPr lang="en-US"/>
           </a:p>
@@ -2435,7 +2472,7 @@
           <a:p>
             <a:fld id="{C1FF6DA9-008F-8B48-92A6-B652298478BF}" type="slidenum">
               <a:rPr lang="en-US" smtClean="0"/>
-              <a:t>‹N°›</a:t>
+              <a:t>‹#›</a:t>
             </a:fld>
             <a:endParaRPr lang="en-US"/>
           </a:p>
@@ -2658,7 +2695,7 @@
           <a:p>
             <a:fld id="{5BCAD085-E8A6-8845-BD4E-CB4CCA059FC4}" type="datetimeFigureOut">
               <a:rPr lang="en-US" smtClean="0"/>
-              <a:t>4/10/2025</a:t>
+              <a:t>4/11/2025</a:t>
             </a:fld>
             <a:endParaRPr lang="en-US"/>
           </a:p>
@@ -2700,7 +2737,7 @@
           <a:p>
             <a:fld id="{C1FF6DA9-008F-8B48-92A6-B652298478BF}" type="slidenum">
               <a:rPr lang="en-US" smtClean="0"/>
-              <a:t>‹N°›</a:t>
+              <a:t>‹#›</a:t>
             </a:fld>
             <a:endParaRPr lang="en-US"/>
           </a:p>
@@ -2907,7 +2944,7 @@
           <a:p>
             <a:fld id="{5BCAD085-E8A6-8845-BD4E-CB4CCA059FC4}" type="datetimeFigureOut">
               <a:rPr lang="en-US" smtClean="0"/>
-              <a:t>4/10/2025</a:t>
+              <a:t>4/11/2025</a:t>
             </a:fld>
             <a:endParaRPr lang="en-US"/>
           </a:p>
@@ -2981,7 +3018,7 @@
           <a:p>
             <a:fld id="{C1FF6DA9-008F-8B48-92A6-B652298478BF}" type="slidenum">
               <a:rPr lang="en-US" smtClean="0"/>
-              <a:t>‹N°›</a:t>
+              <a:t>‹#›</a:t>
             </a:fld>
             <a:endParaRPr lang="en-US"/>
           </a:p>
@@ -4503,6 +4540,117 @@
           </a:prstGeom>
         </p:spPr>
       </p:pic>
+      <p:sp>
+        <p:nvSpPr>
+          <p:cNvPr id="4" name="TextBox 3">
+            <a:extLst>
+              <a:ext uri="{FF2B5EF4-FFF2-40B4-BE49-F238E27FC236}">
+                <a16:creationId xmlns:a16="http://schemas.microsoft.com/office/drawing/2014/main" id="{AC2136DA-0259-022B-DB28-0E1164B0FB03}"/>
+              </a:ext>
+            </a:extLst>
+          </p:cNvPr>
+          <p:cNvSpPr txBox="1"/>
+          <p:nvPr/>
+        </p:nvSpPr>
+        <p:spPr>
+          <a:xfrm>
+            <a:off x="1020904" y="6539309"/>
+            <a:ext cx="7191631" cy="369332"/>
+          </a:xfrm>
+          <a:prstGeom prst="rect">
+            <a:avLst/>
+          </a:prstGeom>
+          <a:noFill/>
+          <a:ln>
+            <a:solidFill>
+              <a:srgbClr val="00B0F0"/>
+            </a:solidFill>
+          </a:ln>
+        </p:spPr>
+        <p:txBody>
+          <a:bodyPr rot="0" spcFirstLastPara="0" vertOverflow="overflow" horzOverflow="overflow" vert="horz" wrap="square" lIns="91440" tIns="45720" rIns="91440" bIns="45720" numCol="1" spcCol="0" rtlCol="0" fromWordArt="0" anchor="t" anchorCtr="0" forceAA="0" compatLnSpc="1">
+            <a:prstTxWarp prst="textNoShape">
+              <a:avLst/>
+            </a:prstTxWarp>
+            <a:spAutoFit/>
+          </a:bodyPr>
+          <a:lstStyle/>
+          <a:p>
+            <a:r>
+              <a:rPr lang="en-US">
+                <a:solidFill>
+                  <a:srgbClr val="00B0F0"/>
+                </a:solidFill>
+              </a:rPr>
+              <a:t>Site </a:t>
+            </a:r>
+            <a:r>
+              <a:rPr lang="en-US" err="1">
+                <a:solidFill>
+                  <a:srgbClr val="00B0F0"/>
+                </a:solidFill>
+              </a:rPr>
+              <a:t>où</a:t>
+            </a:r>
+            <a:r>
+              <a:rPr lang="en-US">
+                <a:solidFill>
+                  <a:srgbClr val="00B0F0"/>
+                </a:solidFill>
+              </a:rPr>
+              <a:t> je suis </a:t>
+            </a:r>
+            <a:r>
+              <a:rPr lang="en-US" err="1">
+                <a:solidFill>
+                  <a:srgbClr val="00B0F0"/>
+                </a:solidFill>
+              </a:rPr>
+              <a:t>l'actualité</a:t>
+            </a:r>
+            <a:r>
+              <a:rPr lang="en-US">
+                <a:solidFill>
+                  <a:srgbClr val="00B0F0"/>
+                </a:solidFill>
+              </a:rPr>
+              <a:t> de la </a:t>
+            </a:r>
+            <a:r>
+              <a:rPr lang="en-US" err="1">
+                <a:solidFill>
+                  <a:srgbClr val="00B0F0"/>
+                </a:solidFill>
+              </a:rPr>
+              <a:t>domotique</a:t>
+            </a:r>
+            <a:r>
+              <a:rPr lang="en-US">
+                <a:solidFill>
+                  <a:srgbClr val="00B0F0"/>
+                </a:solidFill>
+              </a:rPr>
+              <a:t> : </a:t>
+            </a:r>
+            <a:r>
+              <a:rPr lang="en-US" dirty="0">
+                <a:solidFill>
+                  <a:srgbClr val="00B0F0"/>
+                </a:solidFill>
+                <a:ea typeface="+mn-lt"/>
+                <a:cs typeface="+mn-lt"/>
+                <a:hlinkClick r:id="rId3"/>
+              </a:rPr>
+              <a:t>https://www.domo-blog.fr/</a:t>
+            </a:r>
+            <a:endParaRPr lang="en-US" dirty="0">
+              <a:solidFill>
+                <a:srgbClr val="00B0F0"/>
+              </a:solidFill>
+            </a:endParaRPr>
+          </a:p>
+        </p:txBody>
+      </p:sp>
     </p:spTree>
   </p:cSld>
   <p:clrMapOvr>

</xml_diff>